<commit_message>
adjustment for my own needs plus dates
</commit_message>
<xml_diff>
--- a/WDSR - ćwiczenie 2.pptx
+++ b/WDSR - ćwiczenie 2.pptx
@@ -148,7 +148,7 @@
   </p:defaultTextStyle>
   <p:extLst>
     <p:ext uri="{EFAFB233-063F-42B5-8137-9DF3F51BA10A}">
-      <p15:sldGuideLst xmlns:p15="http://schemas.microsoft.com/office/powerpoint/2012/main" xmlns="">
+      <p15:sldGuideLst xmlns:p15="http://schemas.microsoft.com/office/powerpoint/2012/main">
         <p15:guide id="1" orient="horz" pos="1620">
           <p15:clr>
             <a:srgbClr val="A4A3A4"/>
@@ -182,7 +182,7 @@
       </p15:sldGuideLst>
     </p:ext>
     <p:ext uri="{2D200454-40CA-4A62-9FC3-DE9A4176ACB9}">
-      <p15:notesGuideLst xmlns:p15="http://schemas.microsoft.com/office/powerpoint/2012/main" xmlns=""/>
+      <p15:notesGuideLst xmlns:p15="http://schemas.microsoft.com/office/powerpoint/2012/main"/>
     </p:ext>
   </p:extLst>
 </p:presentation>
@@ -277,7 +277,7 @@
             <a:fld id="{C4843D26-F355-3844-A4EF-19D4FD875597}" type="datetimeFigureOut">
               <a:rPr lang="de-DE" smtClean="0"/>
               <a:pPr/>
-              <a:t>07.03.2016</a:t>
+              <a:t>22.02.2017</a:t>
             </a:fld>
             <a:endParaRPr lang="de-DE" dirty="0"/>
           </a:p>
@@ -445,7 +445,7 @@
             <a:fld id="{8E2CFE12-C1FB-D740-8B6C-AFB72D5D4002}" type="datetimeFigureOut">
               <a:rPr lang="de-DE" smtClean="0"/>
               <a:pPr/>
-              <a:t>07.03.2016</a:t>
+              <a:t>22.02.2017</a:t>
             </a:fld>
             <a:endParaRPr lang="de-DE" dirty="0"/>
           </a:p>
@@ -4525,7 +4525,7 @@
   </p:timing>
   <p:extLst mod="1">
     <p:ext uri="{DCECCB84-F9BA-43D5-87BE-67443E8EF086}">
-      <p15:sldGuideLst xmlns:p15="http://schemas.microsoft.com/office/powerpoint/2012/main" xmlns="">
+      <p15:sldGuideLst xmlns:p15="http://schemas.microsoft.com/office/powerpoint/2012/main">
         <p15:guide id="1" orient="horz" pos="1221">
           <p15:clr>
             <a:srgbClr val="C35EA4"/>
@@ -4858,7 +4858,7 @@
   </p:clrMapOvr>
   <p:extLst mod="1">
     <p:ext uri="{DCECCB84-F9BA-43D5-87BE-67443E8EF086}">
-      <p15:sldGuideLst xmlns:p15="http://schemas.microsoft.com/office/powerpoint/2012/main" xmlns="">
+      <p15:sldGuideLst xmlns:p15="http://schemas.microsoft.com/office/powerpoint/2012/main">
         <p15:guide id="1" orient="horz" pos="1221">
           <p15:clr>
             <a:srgbClr val="C35EA4"/>
@@ -5597,7 +5597,7 @@
           <a:graphicData uri="http://schemas.openxmlformats.org/presentationml/2006/ole">
             <mc:AlternateContent xmlns:mc="http://schemas.openxmlformats.org/markup-compatibility/2006">
               <mc:Choice xmlns:v="urn:schemas-microsoft-com:vml" Requires="v">
-                <p:oleObj spid="_x0000_s2248" name="think-cell Folie" r:id="rId4" imgW="305" imgH="303" progId="TCLayout.ActiveDocument.1">
+                <p:oleObj spid="_x0000_s2249" name="think-cell Folie" r:id="rId4" imgW="305" imgH="303" progId="TCLayout.ActiveDocument.1">
                   <p:embed/>
                 </p:oleObj>
               </mc:Choice>
@@ -5994,7 +5994,7 @@
           <a:graphicData uri="http://schemas.openxmlformats.org/presentationml/2006/ole">
             <mc:AlternateContent xmlns:mc="http://schemas.openxmlformats.org/markup-compatibility/2006">
               <mc:Choice xmlns:v="urn:schemas-microsoft-com:vml" Requires="v">
-                <p:oleObj spid="_x0000_s1229" name="think-cell Folie" r:id="rId13" imgW="305" imgH="303" progId="TCLayout.ActiveDocument.1">
+                <p:oleObj spid="_x0000_s1230" name="think-cell Folie" r:id="rId13" imgW="305" imgH="303" progId="TCLayout.ActiveDocument.1">
                   <p:embed/>
                 </p:oleObj>
               </mc:Choice>
@@ -7202,7 +7202,7 @@
   </p:txStyles>
   <p:extLst mod="1">
     <p:ext uri="{27BBF7A9-308A-43DC-89C8-2F10F3537804}">
-      <p15:sldGuideLst xmlns:p15="http://schemas.microsoft.com/office/powerpoint/2012/main" xmlns="">
+      <p15:sldGuideLst xmlns:p15="http://schemas.microsoft.com/office/powerpoint/2012/main">
         <p15:guide id="1" pos="283">
           <p15:clr>
             <a:srgbClr val="FBAE40"/>
@@ -7308,8 +7308,8 @@
         </p:nvSpPr>
         <p:spPr>
           <a:xfrm>
-            <a:off x="976312" y="4178885"/>
-            <a:ext cx="5232400" cy="507831"/>
+            <a:off x="976312" y="4009608"/>
+            <a:ext cx="5232400" cy="677108"/>
           </a:xfrm>
         </p:spPr>
         <p:txBody>
@@ -7318,15 +7318,26 @@
           <a:p>
             <a:r>
               <a:rPr lang="pl-PL" dirty="0" smtClean="0"/>
-              <a:t>Marek Strejczek</a:t>
+              <a:t>Autor: Marek Strejczek</a:t>
+            </a:r>
+          </a:p>
+          <a:p>
+            <a:r>
+              <a:rPr lang="pl-PL" dirty="0" smtClean="0"/>
+              <a:t>Prowadzący: Daniel Boguszewicz</a:t>
             </a:r>
             <a:endParaRPr lang="de-DE" dirty="0" smtClean="0"/>
           </a:p>
           <a:p>
             <a:r>
               <a:rPr lang="pl-PL" dirty="0" smtClean="0"/>
-              <a:t>Lato 2016</a:t>
-            </a:r>
+              <a:t>Lato </a:t>
+            </a:r>
+            <a:r>
+              <a:rPr lang="pl-PL" dirty="0" smtClean="0"/>
+              <a:t>2017</a:t>
+            </a:r>
+            <a:endParaRPr lang="pl-PL" dirty="0" smtClean="0"/>
           </a:p>
           <a:p>
             <a:r>
@@ -7753,7 +7764,6 @@
               <a:rPr lang="pl-PL" sz="1000" dirty="0" smtClean="0"/>
               <a:t>Kolejność wykonywania instrukcji w ramach tego samego wątku może być zmieniana przez maszynę wirtualną.</a:t>
             </a:r>
-            <a:endParaRPr lang="pl-PL" sz="1000" dirty="0" smtClean="0"/>
           </a:p>
           <a:p>
             <a:pPr lvl="2"/>
@@ -8044,21 +8054,8 @@
                   <a:schemeClr val="tx1"/>
                 </a:solidFill>
               </a:rPr>
-              <a:t>Ćwiczenie </a:t>
-            </a:r>
-            <a:r>
-              <a:rPr lang="pl-PL" sz="1600" dirty="0" smtClean="0">
-                <a:solidFill>
-                  <a:schemeClr val="tx1"/>
-                </a:solidFill>
-              </a:rPr>
-              <a:t>2</a:t>
-            </a:r>
-            <a:endParaRPr lang="pl-PL" sz="1600" dirty="0" smtClean="0">
-              <a:solidFill>
-                <a:schemeClr val="tx1"/>
-              </a:solidFill>
-            </a:endParaRPr>
+              <a:t>Ćwiczenie 2</a:t>
+            </a:r>
           </a:p>
           <a:p>
             <a:pPr algn="ctr"/>
@@ -8159,11 +8156,7 @@
           <a:p>
             <a:r>
               <a:rPr lang="pl-PL" dirty="0" smtClean="0"/>
-              <a:t>ĆWICZENIE </a:t>
-            </a:r>
-            <a:r>
-              <a:rPr lang="pl-PL" dirty="0" smtClean="0"/>
-              <a:t>2</a:t>
+              <a:t>ĆWICZENIE 2</a:t>
             </a:r>
             <a:endParaRPr lang="de-DE" dirty="0"/>
           </a:p>
@@ -8195,7 +8188,6 @@
               <a:rPr lang="pl-PL" dirty="0" smtClean="0"/>
               <a:t>3 części:</a:t>
             </a:r>
-            <a:endParaRPr lang="pl-PL" dirty="0" smtClean="0"/>
           </a:p>
           <a:p>
             <a:pPr lvl="1"/>
@@ -8253,11 +8245,6 @@
               </a:rPr>
               <a:t>	Problem producentów i konsumentów</a:t>
             </a:r>
-            <a:endParaRPr lang="pl-PL" dirty="0" smtClean="0">
-              <a:solidFill>
-                <a:srgbClr val="00B050"/>
-              </a:solidFill>
-            </a:endParaRPr>
           </a:p>
           <a:p>
             <a:pPr lvl="1"/>
@@ -8350,11 +8337,7 @@
           <a:p>
             <a:r>
               <a:rPr lang="pl-PL" dirty="0" smtClean="0"/>
-              <a:t>ĆWICZENIE </a:t>
-            </a:r>
-            <a:r>
-              <a:rPr lang="pl-PL" dirty="0" smtClean="0"/>
-              <a:t>2</a:t>
+              <a:t>ĆWICZENIE 2</a:t>
             </a:r>
             <a:endParaRPr lang="de-DE" dirty="0"/>
           </a:p>
@@ -8393,16 +8376,16 @@
               <a:t>https</a:t>
             </a:r>
             <a:r>
-              <a:rPr lang="pl-PL" dirty="0">
+              <a:rPr lang="pl-PL">
                 <a:hlinkClick r:id="rId3"/>
               </a:rPr>
               <a:t>://</a:t>
             </a:r>
             <a:r>
-              <a:rPr lang="pl-PL" dirty="0" smtClean="0">
+              <a:rPr lang="pl-PL" smtClean="0">
                 <a:hlinkClick r:id="rId3"/>
               </a:rPr>
-              <a:t>github.com/wdsr/exercise2</a:t>
+              <a:t>github.com/leinadb/exercise2</a:t>
             </a:r>
             <a:endParaRPr lang="pl-PL" dirty="0" smtClean="0"/>
           </a:p>
@@ -8581,7 +8564,7 @@
         </p:blipFill>
         <p:spPr bwMode="auto">
           <a:xfrm>
-            <a:off x="3668476" y="1273089"/>
+            <a:off x="3661703" y="4015830"/>
             <a:ext cx="4910138" cy="390525"/>
           </a:xfrm>
           <a:prstGeom prst="rect">
@@ -8754,21 +8737,8 @@
                   <a:schemeClr val="tx1"/>
                 </a:solidFill>
               </a:rPr>
-              <a:t>Ćwiczenie </a:t>
-            </a:r>
-            <a:r>
-              <a:rPr lang="pl-PL" sz="1600" dirty="0" smtClean="0">
-                <a:solidFill>
-                  <a:schemeClr val="tx1"/>
-                </a:solidFill>
-              </a:rPr>
-              <a:t>2</a:t>
-            </a:r>
-            <a:endParaRPr lang="pl-PL" sz="1600" dirty="0" smtClean="0">
-              <a:solidFill>
-                <a:schemeClr val="tx1"/>
-              </a:solidFill>
-            </a:endParaRPr>
+              <a:t>Ćwiczenie 2</a:t>
+            </a:r>
           </a:p>
           <a:p>
             <a:pPr algn="ctr"/>
@@ -8873,11 +8843,7 @@
           <a:p>
             <a:r>
               <a:rPr lang="pl-PL" dirty="0" smtClean="0"/>
-              <a:t>ĆWICZENIE </a:t>
-            </a:r>
-            <a:r>
-              <a:rPr lang="pl-PL" dirty="0" smtClean="0"/>
-              <a:t>2</a:t>
+              <a:t>ĆWICZENIE 2</a:t>
             </a:r>
             <a:endParaRPr lang="de-DE" dirty="0"/>
           </a:p>
@@ -8997,7 +8963,6 @@
               <a:rPr lang="pl-PL" dirty="0" smtClean="0"/>
               <a:t>).</a:t>
             </a:r>
-            <a:endParaRPr lang="pl-PL" dirty="0" smtClean="0"/>
           </a:p>
           <a:p>
             <a:endParaRPr lang="pl-PL" dirty="0"/>
@@ -9207,11 +9172,7 @@
           <a:p>
             <a:r>
               <a:rPr lang="pl-PL" dirty="0" smtClean="0"/>
-              <a:t>ĆWICZENIE </a:t>
-            </a:r>
-            <a:r>
-              <a:rPr lang="pl-PL" dirty="0" smtClean="0"/>
-              <a:t>2</a:t>
+              <a:t>ĆWICZENIE 2</a:t>
             </a:r>
             <a:endParaRPr lang="de-DE" dirty="0"/>
           </a:p>
@@ -9388,11 +9349,7 @@
           <a:p>
             <a:r>
               <a:rPr lang="pl-PL" dirty="0" smtClean="0"/>
-              <a:t>ĆWICZENIE </a:t>
-            </a:r>
-            <a:r>
-              <a:rPr lang="pl-PL" dirty="0" smtClean="0"/>
-              <a:t>2</a:t>
+              <a:t>ĆWICZENIE 2</a:t>
             </a:r>
             <a:endParaRPr lang="de-DE" dirty="0"/>
           </a:p>
@@ -9541,11 +9498,7 @@
           <a:p>
             <a:r>
               <a:rPr lang="pl-PL" dirty="0" smtClean="0"/>
-              <a:t>ĆWICZENIE </a:t>
-            </a:r>
-            <a:r>
-              <a:rPr lang="pl-PL" dirty="0" smtClean="0"/>
-              <a:t>2</a:t>
+              <a:t>ĆWICZENIE 2</a:t>
             </a:r>
             <a:endParaRPr lang="de-DE" dirty="0"/>
           </a:p>
@@ -9804,7 +9757,6 @@
               <a:rPr lang="pl-PL" dirty="0" smtClean="0"/>
               <a:t>.</a:t>
             </a:r>
-            <a:endParaRPr lang="pl-PL" dirty="0" smtClean="0"/>
           </a:p>
           <a:p>
             <a:pPr marL="523875" lvl="1" indent="-342900"/>
@@ -9966,7 +9918,6 @@
               <a:rPr lang="pl-PL" dirty="0" smtClean="0"/>
               <a:t>.</a:t>
             </a:r>
-            <a:endParaRPr lang="pl-PL" dirty="0" smtClean="0"/>
           </a:p>
           <a:p>
             <a:pPr lvl="2"/>
@@ -10067,7 +10018,6 @@
               <a:rPr lang="pl-PL" sz="900" dirty="0" smtClean="0"/>
               <a:t>l</a:t>
             </a:r>
-            <a:endParaRPr lang="pl-PL" sz="900" dirty="0" smtClean="0"/>
           </a:p>
         </p:txBody>
       </p:sp>
@@ -10312,11 +10262,7 @@
           <a:p>
             <a:r>
               <a:rPr lang="pl-PL" dirty="0" smtClean="0"/>
-              <a:t>ĆWICZENIE </a:t>
-            </a:r>
-            <a:r>
-              <a:rPr lang="pl-PL" dirty="0" smtClean="0"/>
-              <a:t>2</a:t>
+              <a:t>ĆWICZENIE 2</a:t>
             </a:r>
             <a:endParaRPr lang="de-DE" dirty="0"/>
           </a:p>
@@ -10536,11 +10482,7 @@
           <a:p>
             <a:r>
               <a:rPr lang="pl-PL" dirty="0" smtClean="0"/>
-              <a:t>ĆWICZENIE </a:t>
-            </a:r>
-            <a:r>
-              <a:rPr lang="pl-PL" dirty="0" smtClean="0"/>
-              <a:t>2</a:t>
+              <a:t>ĆWICZENIE 2</a:t>
             </a:r>
             <a:endParaRPr lang="de-DE" dirty="0"/>
           </a:p>
@@ -10908,21 +10850,8 @@
                   <a:schemeClr val="tx1"/>
                 </a:solidFill>
               </a:rPr>
-              <a:t>Ćwiczenie </a:t>
-            </a:r>
-            <a:r>
-              <a:rPr lang="pl-PL" sz="1600" dirty="0" smtClean="0">
-                <a:solidFill>
-                  <a:schemeClr val="tx1"/>
-                </a:solidFill>
-              </a:rPr>
-              <a:t>2</a:t>
-            </a:r>
-            <a:endParaRPr lang="pl-PL" sz="1600" dirty="0" smtClean="0">
-              <a:solidFill>
-                <a:schemeClr val="tx1"/>
-              </a:solidFill>
-            </a:endParaRPr>
+              <a:t>Ćwiczenie 2</a:t>
+            </a:r>
           </a:p>
           <a:p>
             <a:pPr algn="ctr"/>
@@ -11027,11 +10956,7 @@
           <a:p>
             <a:r>
               <a:rPr lang="pl-PL" dirty="0" smtClean="0"/>
-              <a:t>ĆWICZENIE </a:t>
-            </a:r>
-            <a:r>
-              <a:rPr lang="pl-PL" dirty="0" smtClean="0"/>
-              <a:t>2</a:t>
+              <a:t>ĆWICZENIE 2</a:t>
             </a:r>
             <a:endParaRPr lang="de-DE" dirty="0"/>
           </a:p>
@@ -11350,11 +11275,7 @@
           <a:p>
             <a:r>
               <a:rPr lang="pl-PL" dirty="0" smtClean="0"/>
-              <a:t>ĆWICZENIE </a:t>
-            </a:r>
-            <a:r>
-              <a:rPr lang="pl-PL" dirty="0" smtClean="0"/>
-              <a:t>2</a:t>
+              <a:t>ĆWICZENIE 2</a:t>
             </a:r>
             <a:endParaRPr lang="de-DE" dirty="0"/>
           </a:p>
@@ -11531,11 +11452,7 @@
           <a:p>
             <a:r>
               <a:rPr lang="pl-PL" dirty="0" smtClean="0"/>
-              <a:t>ĆWICZENIE </a:t>
-            </a:r>
-            <a:r>
-              <a:rPr lang="pl-PL" dirty="0" smtClean="0"/>
-              <a:t>2</a:t>
+              <a:t>ĆWICZENIE 2</a:t>
             </a:r>
             <a:endParaRPr lang="de-DE" dirty="0"/>
           </a:p>
@@ -11684,11 +11601,7 @@
           <a:p>
             <a:r>
               <a:rPr lang="pl-PL" dirty="0" smtClean="0"/>
-              <a:t>ĆWICZENIE </a:t>
-            </a:r>
-            <a:r>
-              <a:rPr lang="pl-PL" dirty="0" smtClean="0"/>
-              <a:t>2</a:t>
+              <a:t>ĆWICZENIE 2</a:t>
             </a:r>
             <a:endParaRPr lang="de-DE" dirty="0"/>
           </a:p>
@@ -11950,11 +11863,7 @@
           <a:p>
             <a:r>
               <a:rPr lang="pl-PL" dirty="0" smtClean="0"/>
-              <a:t>ĆWICZENIE </a:t>
-            </a:r>
-            <a:r>
-              <a:rPr lang="pl-PL" dirty="0" smtClean="0"/>
-              <a:t>2</a:t>
+              <a:t>ĆWICZENIE 2</a:t>
             </a:r>
             <a:endParaRPr lang="de-DE" dirty="0"/>
           </a:p>
@@ -12312,11 +12221,7 @@
           <a:p>
             <a:r>
               <a:rPr lang="pl-PL" dirty="0" smtClean="0"/>
-              <a:t>ĆWICZENIE </a:t>
-            </a:r>
-            <a:r>
-              <a:rPr lang="pl-PL" dirty="0" smtClean="0"/>
-              <a:t>2</a:t>
+              <a:t>ĆWICZENIE 2</a:t>
             </a:r>
             <a:endParaRPr lang="de-DE" dirty="0"/>
           </a:p>
@@ -12584,11 +12489,7 @@
           <a:p>
             <a:r>
               <a:rPr lang="pl-PL" dirty="0" smtClean="0"/>
-              <a:t>ĆWICZENIE </a:t>
-            </a:r>
-            <a:r>
-              <a:rPr lang="pl-PL" dirty="0" smtClean="0"/>
-              <a:t>2</a:t>
+              <a:t>ĆWICZENIE 2</a:t>
             </a:r>
             <a:endParaRPr lang="de-DE" dirty="0"/>
           </a:p>
@@ -12675,7 +12576,6 @@
               <a:rPr lang="pl-PL" dirty="0" smtClean="0"/>
               <a:t> (i podobne) udostępniają operacje modyfikujące zawartość pamięci jako operacje niepodzielne, które mogą być bezpiecznie używane przez wiele wątków bez potrzeby dodatkowej synchronizacji.</a:t>
             </a:r>
-            <a:endParaRPr lang="pl-PL" dirty="0" smtClean="0"/>
           </a:p>
           <a:p>
             <a:pPr lvl="1"/>
@@ -12898,7 +12798,6 @@
               <a:rPr lang="pl-PL" dirty="0" smtClean="0"/>
               <a:t>Systemy rozproszone pozwalają na korzystanie z zasobów danego komputera przez więcej niż jednego użytkownika.</a:t>
             </a:r>
-            <a:endParaRPr lang="pl-PL" dirty="0" smtClean="0"/>
           </a:p>
         </p:txBody>
       </p:sp>
@@ -13223,11 +13122,7 @@
           <a:p>
             <a:r>
               <a:rPr lang="pl-PL" dirty="0" smtClean="0"/>
-              <a:t>ĆWICZENIE </a:t>
-            </a:r>
-            <a:r>
-              <a:rPr lang="pl-PL" dirty="0" smtClean="0"/>
-              <a:t>2</a:t>
+              <a:t>ĆWICZENIE 2</a:t>
             </a:r>
             <a:endParaRPr lang="de-DE" dirty="0"/>
           </a:p>
@@ -13541,21 +13436,8 @@
                   <a:schemeClr val="tx1"/>
                 </a:solidFill>
               </a:rPr>
-              <a:t>Ćwiczenie </a:t>
-            </a:r>
-            <a:r>
-              <a:rPr lang="pl-PL" sz="1600" dirty="0" smtClean="0">
-                <a:solidFill>
-                  <a:schemeClr val="tx1"/>
-                </a:solidFill>
-              </a:rPr>
-              <a:t>2</a:t>
-            </a:r>
-            <a:endParaRPr lang="pl-PL" sz="1600" dirty="0" smtClean="0">
-              <a:solidFill>
-                <a:schemeClr val="tx1"/>
-              </a:solidFill>
-            </a:endParaRPr>
+              <a:t>Ćwiczenie 2</a:t>
+            </a:r>
           </a:p>
           <a:p>
             <a:pPr algn="ctr"/>
@@ -13660,11 +13542,7 @@
           <a:p>
             <a:r>
               <a:rPr lang="pl-PL" dirty="0" smtClean="0"/>
-              <a:t>ĆWICZENIE </a:t>
-            </a:r>
-            <a:r>
-              <a:rPr lang="pl-PL" dirty="0" smtClean="0"/>
-              <a:t>2</a:t>
+              <a:t>ĆWICZENIE 2</a:t>
             </a:r>
             <a:endParaRPr lang="de-DE" dirty="0"/>
           </a:p>
@@ -13983,11 +13861,7 @@
           <a:p>
             <a:r>
               <a:rPr lang="pl-PL" dirty="0" smtClean="0"/>
-              <a:t>ĆWICZENIE </a:t>
-            </a:r>
-            <a:r>
-              <a:rPr lang="pl-PL" dirty="0" smtClean="0"/>
-              <a:t>2</a:t>
+              <a:t>ĆWICZENIE 2</a:t>
             </a:r>
             <a:endParaRPr lang="de-DE" dirty="0"/>
           </a:p>
@@ -14164,11 +14038,7 @@
           <a:p>
             <a:r>
               <a:rPr lang="pl-PL" dirty="0" smtClean="0"/>
-              <a:t>ĆWICZENIE </a:t>
-            </a:r>
-            <a:r>
-              <a:rPr lang="pl-PL" dirty="0" smtClean="0"/>
-              <a:t>2</a:t>
+              <a:t>ĆWICZENIE 2</a:t>
             </a:r>
             <a:endParaRPr lang="de-DE" dirty="0"/>
           </a:p>
@@ -14458,11 +14328,7 @@
           <a:p>
             <a:r>
               <a:rPr lang="pl-PL" dirty="0" smtClean="0"/>
-              <a:t>ĆWICZENIE </a:t>
-            </a:r>
-            <a:r>
-              <a:rPr lang="pl-PL" dirty="0" smtClean="0"/>
-              <a:t>2</a:t>
+              <a:t>ĆWICZENIE 2</a:t>
             </a:r>
             <a:endParaRPr lang="de-DE" dirty="0"/>
           </a:p>
@@ -14790,11 +14656,7 @@
           <a:p>
             <a:r>
               <a:rPr lang="pl-PL" dirty="0" smtClean="0"/>
-              <a:t>ĆWICZENIE </a:t>
-            </a:r>
-            <a:r>
-              <a:rPr lang="pl-PL" dirty="0" smtClean="0"/>
-              <a:t>2</a:t>
+              <a:t>ĆWICZENIE 2</a:t>
             </a:r>
             <a:endParaRPr lang="de-DE" dirty="0"/>
           </a:p>
@@ -15326,15 +15188,7 @@
             </a:r>
             <a:r>
               <a:rPr lang="pl-PL" sz="1000" b="1" dirty="0" smtClean="0"/>
-              <a:t>Kolejność </a:t>
-            </a:r>
-            <a:r>
-              <a:rPr lang="pl-PL" sz="1000" b="1" dirty="0" smtClean="0"/>
-              <a:t>i</a:t>
-            </a:r>
-            <a:r>
-              <a:rPr lang="pl-PL" sz="1000" b="1" dirty="0" smtClean="0"/>
-              <a:t>nstrukcji, pomiędzy którymi nie ma zależności „</a:t>
+              <a:t>Kolejność instrukcji, pomiędzy którymi nie ma zależności „</a:t>
             </a:r>
             <a:r>
               <a:rPr lang="pl-PL" sz="1000" b="1" dirty="0" err="1" smtClean="0"/>
@@ -15359,7 +15213,6 @@
               <a:rPr lang="pl-PL" sz="1000" dirty="0" smtClean="0"/>
               <a:t>Przykład - jeśli efekt wywołania instrukcji I12 nie zależy od wywołania instrukcji I11 to maszyna wirtualna może zamienić kolejność wykonania tych dwóch instrukcji – w efekcie możliwa staje się na przykład sekwencja I12, I11, I21, I22.</a:t>
             </a:r>
-            <a:endParaRPr lang="pl-PL" sz="1000" dirty="0" smtClean="0"/>
           </a:p>
         </p:txBody>
       </p:sp>
@@ -16417,7 +16270,6 @@
               <a:rPr lang="pl-PL" dirty="0" smtClean="0"/>
               <a:t>Bezpieczne i żywotne rozwiązanie może być nieakceptowalne na przykład z uwagi na nieefektywne wykorzystanie zasobów.</a:t>
             </a:r>
-            <a:endParaRPr lang="pl-PL" dirty="0" smtClean="0"/>
           </a:p>
         </p:txBody>
       </p:sp>
@@ -17114,11 +16966,7 @@
             <a:pPr lvl="3"/>
             <a:r>
               <a:rPr lang="pl-PL" dirty="0" smtClean="0"/>
-              <a:t>K</a:t>
-            </a:r>
-            <a:r>
-              <a:rPr lang="pl-PL" dirty="0" smtClean="0"/>
-              <a:t>ilka procesów współzawodniczy o dostęp do jakiegoś zasobu/sekcji krytycznej.</a:t>
+              <a:t>Kilka procesów współzawodniczy o dostęp do jakiegoś zasobu/sekcji krytycznej.</a:t>
             </a:r>
           </a:p>
           <a:p>
@@ -17674,7 +17522,6 @@
               <a:rPr lang="pl-PL" dirty="0" smtClean="0"/>
               <a:t>Zasada</a:t>
             </a:r>
-            <a:endParaRPr lang="pl-PL" dirty="0" smtClean="0"/>
           </a:p>
           <a:p>
             <a:pPr lvl="3"/>
@@ -18108,7 +17955,7 @@
   <a:extraClrSchemeLst/>
   <a:extLst>
     <a:ext uri="{05A4C25C-085E-4340-85A3-A5531E510DB2}">
-      <thm15:themeFamily xmlns:thm15="http://schemas.microsoft.com/office/thememl/2012/main" xmlns="" name="GFT_Chartpool_2015.pptx" id="{A28C9458-9558-44C8-89F4-D7A2CBC04405}" vid="{0F156D25-70FA-498B-891B-4FDE46BF1046}"/>
+      <thm15:themeFamily xmlns:thm15="http://schemas.microsoft.com/office/thememl/2012/main" name="GFT_Chartpool_2015.pptx" id="{A28C9458-9558-44C8-89F4-D7A2CBC04405}" vid="{0F156D25-70FA-498B-891B-4FDE46BF1046}"/>
     </a:ext>
   </a:extLst>
 </a:theme>
@@ -18755,6 +18602,41 @@
 </file>
 
 <file path=customXml/item1.xml><?xml version="1.0" encoding="utf-8"?>
+<p:properties xmlns:p="http://schemas.microsoft.com/office/2006/metadata/properties" xmlns:xsi="http://www.w3.org/2001/XMLSchema-instance" xmlns:pc="http://schemas.microsoft.com/office/infopath/2007/PartnerControls">
+  <documentManagement>
+    <_dlc_DocId xmlns="727178e8-9586-4f49-8e7b-77af9c2fb085">CVD5QAC74SYH-2-13943</_dlc_DocId>
+    <_dlc_DocIdUrl xmlns="727178e8-9586-4f49-8e7b-77af9c2fb085">
+      <Url>https://share.gft.com/sites/Corporate-Marketing/_layouts/DocIdRedir.aspx?ID=CVD5QAC74SYH-2-13943</Url>
+      <Description>CVD5QAC74SYH-2-13943</Description>
+    </_dlc_DocIdUrl>
+    <Functional_x0020_Area xmlns="e44e039f-c551-4112-981c-456f1b630ef1">Functional Area 1</Functional_x0020_Area>
+    <Reference_x0020_Title xmlns="e44e039f-c551-4112-981c-456f1b630ef1" xsi:nil="true"/>
+    <Area xmlns="e44e039f-c551-4112-981c-456f1b630ef1">Area 1</Area>
+    <Project_x0020_size_x0020__x0028_resources_x0029_ xmlns="e44e039f-c551-4112-981c-456f1b630ef1" xsi:nil="true"/>
+    <Comments xmlns="e44e039f-c551-4112-981c-456f1b630ef1" xsi:nil="true"/>
+    <Business_x0020_Sector xmlns="e44e039f-c551-4112-981c-456f1b630ef1">Banking</Business_x0020_Sector>
+    <Client_x0020_Category xmlns="e44e039f-c551-4112-981c-456f1b630ef1">Central</Client_x0020_Category>
+    <Methods_x0020_and_x0020_standards xmlns="e44e039f-c551-4112-981c-456f1b630ef1" xsi:nil="true"/>
+    <Responsible xmlns="e44e039f-c551-4112-981c-456f1b630ef1">Marek Strejczek</Responsible>
+    <Client_x0020_Name xmlns="e44e039f-c551-4112-981c-456f1b630ef1" xsi:nil="true"/>
+    <Client_x0020_approval xmlns="e44e039f-c551-4112-981c-456f1b630ef1">No</Client_x0020_approval>
+    <Plattform_x0020__x0026__x0020_tools xmlns="e44e039f-c551-4112-981c-456f1b630ef1" xsi:nil="true"/>
+    <Project_x0020_ID xmlns="e44e039f-c551-4112-981c-456f1b630ef1" xsi:nil="true"/>
+    <Description0 xmlns="e44e039f-c551-4112-981c-456f1b630ef1" xsi:nil="true"/>
+    <Author_x0020__x002f__x0020_Contact xmlns="e44e039f-c551-4112-981c-456f1b630ef1">
+      <UserInfo>
+        <DisplayName/>
+        <AccountId xsi:nil="true"/>
+        <AccountType/>
+      </UserInfo>
+    </Author_x0020__x002f__x0020_Contact>
+    <Client_x0020_Country xmlns="e44e039f-c551-4112-981c-456f1b630ef1">Germany</Client_x0020_Country>
+    <Year xmlns="e44e039f-c551-4112-981c-456f1b630ef1" xsi:nil="true"/>
+  </documentManagement>
+</p:properties>
+</file>
+
+<file path=customXml/item2.xml><?xml version="1.0" encoding="utf-8"?>
 <?mso-contentType ?>
 <spe:Receivers xmlns:spe="http://schemas.microsoft.com/sharepoint/events">
   <Receiver>
@@ -18800,42 +18682,16 @@
 </spe:Receivers>
 </file>
 
-<file path=customXml/item2.xml><?xml version="1.0" encoding="utf-8"?>
-<p:properties xmlns:p="http://schemas.microsoft.com/office/2006/metadata/properties" xmlns:xsi="http://www.w3.org/2001/XMLSchema-instance" xmlns:pc="http://schemas.microsoft.com/office/infopath/2007/PartnerControls">
-  <documentManagement>
-    <_dlc_DocId xmlns="727178e8-9586-4f49-8e7b-77af9c2fb085">CVD5QAC74SYH-2-13943</_dlc_DocId>
-    <_dlc_DocIdUrl xmlns="727178e8-9586-4f49-8e7b-77af9c2fb085">
-      <Url>https://share.gft.com/sites/Corporate-Marketing/_layouts/DocIdRedir.aspx?ID=CVD5QAC74SYH-2-13943</Url>
-      <Description>CVD5QAC74SYH-2-13943</Description>
-    </_dlc_DocIdUrl>
-    <Functional_x0020_Area xmlns="e44e039f-c551-4112-981c-456f1b630ef1">Functional Area 1</Functional_x0020_Area>
-    <Reference_x0020_Title xmlns="e44e039f-c551-4112-981c-456f1b630ef1" xsi:nil="true"/>
-    <Area xmlns="e44e039f-c551-4112-981c-456f1b630ef1">Area 1</Area>
-    <Project_x0020_size_x0020__x0028_resources_x0029_ xmlns="e44e039f-c551-4112-981c-456f1b630ef1" xsi:nil="true"/>
-    <Comments xmlns="e44e039f-c551-4112-981c-456f1b630ef1" xsi:nil="true"/>
-    <Business_x0020_Sector xmlns="e44e039f-c551-4112-981c-456f1b630ef1">Banking</Business_x0020_Sector>
-    <Client_x0020_Category xmlns="e44e039f-c551-4112-981c-456f1b630ef1">Central</Client_x0020_Category>
-    <Methods_x0020_and_x0020_standards xmlns="e44e039f-c551-4112-981c-456f1b630ef1" xsi:nil="true"/>
-    <Responsible xmlns="e44e039f-c551-4112-981c-456f1b630ef1">Marek Strejczek</Responsible>
-    <Client_x0020_Name xmlns="e44e039f-c551-4112-981c-456f1b630ef1" xsi:nil="true"/>
-    <Client_x0020_approval xmlns="e44e039f-c551-4112-981c-456f1b630ef1">No</Client_x0020_approval>
-    <Plattform_x0020__x0026__x0020_tools xmlns="e44e039f-c551-4112-981c-456f1b630ef1" xsi:nil="true"/>
-    <Project_x0020_ID xmlns="e44e039f-c551-4112-981c-456f1b630ef1" xsi:nil="true"/>
-    <Description0 xmlns="e44e039f-c551-4112-981c-456f1b630ef1" xsi:nil="true"/>
-    <Author_x0020__x002f__x0020_Contact xmlns="e44e039f-c551-4112-981c-456f1b630ef1">
-      <UserInfo>
-        <DisplayName/>
-        <AccountId xsi:nil="true"/>
-        <AccountType/>
-      </UserInfo>
-    </Author_x0020__x002f__x0020_Contact>
-    <Client_x0020_Country xmlns="e44e039f-c551-4112-981c-456f1b630ef1">Germany</Client_x0020_Country>
-    <Year xmlns="e44e039f-c551-4112-981c-456f1b630ef1" xsi:nil="true"/>
-  </documentManagement>
-</p:properties>
+<file path=customXml/item3.xml><?xml version="1.0" encoding="utf-8"?>
+<?mso-contentType ?>
+<FormTemplates xmlns="http://schemas.microsoft.com/sharepoint/v3/contenttype/forms">
+  <Display>DocumentLibraryForm</Display>
+  <Edit>DocumentLibraryForm</Edit>
+  <New>DocumentLibraryForm</New>
+</FormTemplates>
 </file>
 
-<file path=customXml/item3.xml><?xml version="1.0" encoding="utf-8"?>
+<file path=customXml/item4.xml><?xml version="1.0" encoding="utf-8"?>
 <ct:contentTypeSchema xmlns:ct="http://schemas.microsoft.com/office/2006/metadata/contentType" xmlns:ma="http://schemas.microsoft.com/office/2006/metadata/properties/metaAttributes" ct:_="" ma:_="" ma:contentTypeName="Document" ma:contentTypeID="0x010100793B9935CA02AD4F90F0A0FD564FDD82" ma:contentTypeVersion="17" ma:contentTypeDescription="Create a new document." ma:contentTypeScope="" ma:versionID="6168266ad0b2c1ccdc9d2ae0268a5eb6">
   <xsd:schema xmlns:xsd="http://www.w3.org/2001/XMLSchema" xmlns:xs="http://www.w3.org/2001/XMLSchema" xmlns:p="http://schemas.microsoft.com/office/2006/metadata/properties" xmlns:ns2="e44e039f-c551-4112-981c-456f1b630ef1" xmlns:ns3="727178e8-9586-4f49-8e7b-77af9c2fb085" targetNamespace="http://schemas.microsoft.com/office/2006/metadata/properties" ma:root="true" ma:fieldsID="b9b29daf9bb73cd90369de1b0e977594" ns2:_="" ns3:_="">
     <xsd:import namespace="e44e039f-c551-4112-981c-456f1b630ef1"/>
@@ -19332,24 +19188,7 @@
 </ct:contentTypeSchema>
 </file>
 
-<file path=customXml/item4.xml><?xml version="1.0" encoding="utf-8"?>
-<?mso-contentType ?>
-<FormTemplates xmlns="http://schemas.microsoft.com/sharepoint/v3/contenttype/forms">
-  <Display>DocumentLibraryForm</Display>
-  <Edit>DocumentLibraryForm</Edit>
-  <New>DocumentLibraryForm</New>
-</FormTemplates>
-</file>
-
 <file path=customXml/itemProps1.xml><?xml version="1.0" encoding="utf-8"?>
-<ds:datastoreItem xmlns:ds="http://schemas.openxmlformats.org/officeDocument/2006/customXml" ds:itemID="{A6F3EA8F-EBA0-438A-80BD-6A96E2E10054}">
-  <ds:schemaRefs>
-    <ds:schemaRef ds:uri="http://schemas.microsoft.com/sharepoint/events"/>
-  </ds:schemaRefs>
-</ds:datastoreItem>
-</file>
-
-<file path=customXml/itemProps2.xml><?xml version="1.0" encoding="utf-8"?>
 <ds:datastoreItem xmlns:ds="http://schemas.openxmlformats.org/officeDocument/2006/customXml" ds:itemID="{7445AAF4-B73F-4E3A-B9D2-4DDAE0F1BE8A}">
   <ds:schemaRefs>
     <ds:schemaRef ds:uri="http://purl.org/dc/dcmitype/"/>
@@ -19366,7 +19205,23 @@
 </ds:datastoreItem>
 </file>
 
+<file path=customXml/itemProps2.xml><?xml version="1.0" encoding="utf-8"?>
+<ds:datastoreItem xmlns:ds="http://schemas.openxmlformats.org/officeDocument/2006/customXml" ds:itemID="{A6F3EA8F-EBA0-438A-80BD-6A96E2E10054}">
+  <ds:schemaRefs>
+    <ds:schemaRef ds:uri="http://schemas.microsoft.com/sharepoint/events"/>
+  </ds:schemaRefs>
+</ds:datastoreItem>
+</file>
+
 <file path=customXml/itemProps3.xml><?xml version="1.0" encoding="utf-8"?>
+<ds:datastoreItem xmlns:ds="http://schemas.openxmlformats.org/officeDocument/2006/customXml" ds:itemID="{9217953E-6BB7-40C6-9A84-608D0A8D65EC}">
+  <ds:schemaRefs>
+    <ds:schemaRef ds:uri="http://schemas.microsoft.com/sharepoint/v3/contenttype/forms"/>
+  </ds:schemaRefs>
+</ds:datastoreItem>
+</file>
+
+<file path=customXml/itemProps4.xml><?xml version="1.0" encoding="utf-8"?>
 <ds:datastoreItem xmlns:ds="http://schemas.openxmlformats.org/officeDocument/2006/customXml" ds:itemID="{54CA1130-EAC1-4116-82E4-DF5A51FE3AEA}">
   <ds:schemaRefs>
     <ds:schemaRef ds:uri="http://schemas.microsoft.com/office/2006/metadata/contentType"/>
@@ -19383,12 +19238,4 @@
     <ds:schemaRef ds:uri="http://schemas.microsoft.com/internal/obd"/>
   </ds:schemaRefs>
 </ds:datastoreItem>
-</file>
-
-<file path=customXml/itemProps4.xml><?xml version="1.0" encoding="utf-8"?>
-<ds:datastoreItem xmlns:ds="http://schemas.openxmlformats.org/officeDocument/2006/customXml" ds:itemID="{9217953E-6BB7-40C6-9A84-608D0A8D65EC}">
-  <ds:schemaRefs>
-    <ds:schemaRef ds:uri="http://schemas.microsoft.com/sharepoint/v3/contenttype/forms"/>
-  </ds:schemaRefs>
-</ds:datastoreItem>
 </file>
</xml_diff>

<commit_message>
adjustment for my own needs
</commit_message>
<xml_diff>
--- a/WDSR - ćwiczenie 2.pptx
+++ b/WDSR - ćwiczenie 2.pptx
@@ -5597,7 +5597,7 @@
           <a:graphicData uri="http://schemas.openxmlformats.org/presentationml/2006/ole">
             <mc:AlternateContent xmlns:mc="http://schemas.openxmlformats.org/markup-compatibility/2006">
               <mc:Choice xmlns:v="urn:schemas-microsoft-com:vml" Requires="v">
-                <p:oleObj spid="_x0000_s2249" name="think-cell Folie" r:id="rId4" imgW="305" imgH="303" progId="TCLayout.ActiveDocument.1">
+                <p:oleObj spid="_x0000_s2250" name="think-cell Folie" r:id="rId4" imgW="305" imgH="303" progId="TCLayout.ActiveDocument.1">
                   <p:embed/>
                 </p:oleObj>
               </mc:Choice>
@@ -5994,7 +5994,7 @@
           <a:graphicData uri="http://schemas.openxmlformats.org/presentationml/2006/ole">
             <mc:AlternateContent xmlns:mc="http://schemas.openxmlformats.org/markup-compatibility/2006">
               <mc:Choice xmlns:v="urn:schemas-microsoft-com:vml" Requires="v">
-                <p:oleObj spid="_x0000_s1230" name="think-cell Folie" r:id="rId13" imgW="305" imgH="303" progId="TCLayout.ActiveDocument.1">
+                <p:oleObj spid="_x0000_s1231" name="think-cell Folie" r:id="rId13" imgW="305" imgH="303" progId="TCLayout.ActiveDocument.1">
                   <p:embed/>
                 </p:oleObj>
               </mc:Choice>
@@ -7331,13 +7331,8 @@
           <a:p>
             <a:r>
               <a:rPr lang="pl-PL" dirty="0" smtClean="0"/>
-              <a:t>Lato </a:t>
-            </a:r>
-            <a:r>
-              <a:rPr lang="pl-PL" dirty="0" smtClean="0"/>
-              <a:t>2017</a:t>
-            </a:r>
-            <a:endParaRPr lang="pl-PL" dirty="0" smtClean="0"/>
+              <a:t>Lato 2017</a:t>
+            </a:r>
           </a:p>
           <a:p>
             <a:r>
@@ -14937,14 +14932,14 @@
           <a:p>
             <a:r>
               <a:rPr lang="pl-PL" dirty="0" smtClean="0"/>
-              <a:t>Marek Strejczek</a:t>
+              <a:t>Daniel Boguszewicz</a:t>
             </a:r>
             <a:endParaRPr lang="de-DE" dirty="0"/>
           </a:p>
           <a:p>
             <a:r>
               <a:rPr lang="pl-PL" dirty="0" smtClean="0"/>
-              <a:t>Technical Architect</a:t>
+              <a:t>Java Developer</a:t>
             </a:r>
             <a:endParaRPr lang="de-DE" dirty="0"/>
           </a:p>
@@ -14976,8 +14971,12 @@
           </a:p>
           <a:p>
             <a:r>
-              <a:rPr lang="pl-PL" dirty="0" err="1" smtClean="0"/>
-              <a:t>marek.strejczek</a:t>
+              <a:rPr lang="pl-PL"/>
+              <a:t>d</a:t>
+            </a:r>
+            <a:r>
+              <a:rPr lang="pl-PL" smtClean="0"/>
+              <a:t>aniel.boguszewicz</a:t>
             </a:r>
             <a:r>
               <a:rPr lang="de-DE" dirty="0" smtClean="0"/>
@@ -18602,41 +18601,6 @@
 </file>
 
 <file path=customXml/item1.xml><?xml version="1.0" encoding="utf-8"?>
-<p:properties xmlns:p="http://schemas.microsoft.com/office/2006/metadata/properties" xmlns:xsi="http://www.w3.org/2001/XMLSchema-instance" xmlns:pc="http://schemas.microsoft.com/office/infopath/2007/PartnerControls">
-  <documentManagement>
-    <_dlc_DocId xmlns="727178e8-9586-4f49-8e7b-77af9c2fb085">CVD5QAC74SYH-2-13943</_dlc_DocId>
-    <_dlc_DocIdUrl xmlns="727178e8-9586-4f49-8e7b-77af9c2fb085">
-      <Url>https://share.gft.com/sites/Corporate-Marketing/_layouts/DocIdRedir.aspx?ID=CVD5QAC74SYH-2-13943</Url>
-      <Description>CVD5QAC74SYH-2-13943</Description>
-    </_dlc_DocIdUrl>
-    <Functional_x0020_Area xmlns="e44e039f-c551-4112-981c-456f1b630ef1">Functional Area 1</Functional_x0020_Area>
-    <Reference_x0020_Title xmlns="e44e039f-c551-4112-981c-456f1b630ef1" xsi:nil="true"/>
-    <Area xmlns="e44e039f-c551-4112-981c-456f1b630ef1">Area 1</Area>
-    <Project_x0020_size_x0020__x0028_resources_x0029_ xmlns="e44e039f-c551-4112-981c-456f1b630ef1" xsi:nil="true"/>
-    <Comments xmlns="e44e039f-c551-4112-981c-456f1b630ef1" xsi:nil="true"/>
-    <Business_x0020_Sector xmlns="e44e039f-c551-4112-981c-456f1b630ef1">Banking</Business_x0020_Sector>
-    <Client_x0020_Category xmlns="e44e039f-c551-4112-981c-456f1b630ef1">Central</Client_x0020_Category>
-    <Methods_x0020_and_x0020_standards xmlns="e44e039f-c551-4112-981c-456f1b630ef1" xsi:nil="true"/>
-    <Responsible xmlns="e44e039f-c551-4112-981c-456f1b630ef1">Marek Strejczek</Responsible>
-    <Client_x0020_Name xmlns="e44e039f-c551-4112-981c-456f1b630ef1" xsi:nil="true"/>
-    <Client_x0020_approval xmlns="e44e039f-c551-4112-981c-456f1b630ef1">No</Client_x0020_approval>
-    <Plattform_x0020__x0026__x0020_tools xmlns="e44e039f-c551-4112-981c-456f1b630ef1" xsi:nil="true"/>
-    <Project_x0020_ID xmlns="e44e039f-c551-4112-981c-456f1b630ef1" xsi:nil="true"/>
-    <Description0 xmlns="e44e039f-c551-4112-981c-456f1b630ef1" xsi:nil="true"/>
-    <Author_x0020__x002f__x0020_Contact xmlns="e44e039f-c551-4112-981c-456f1b630ef1">
-      <UserInfo>
-        <DisplayName/>
-        <AccountId xsi:nil="true"/>
-        <AccountType/>
-      </UserInfo>
-    </Author_x0020__x002f__x0020_Contact>
-    <Client_x0020_Country xmlns="e44e039f-c551-4112-981c-456f1b630ef1">Germany</Client_x0020_Country>
-    <Year xmlns="e44e039f-c551-4112-981c-456f1b630ef1" xsi:nil="true"/>
-  </documentManagement>
-</p:properties>
-</file>
-
-<file path=customXml/item2.xml><?xml version="1.0" encoding="utf-8"?>
 <?mso-contentType ?>
 <spe:Receivers xmlns:spe="http://schemas.microsoft.com/sharepoint/events">
   <Receiver>
@@ -18682,16 +18646,42 @@
 </spe:Receivers>
 </file>
 
-<file path=customXml/item3.xml><?xml version="1.0" encoding="utf-8"?>
-<?mso-contentType ?>
-<FormTemplates xmlns="http://schemas.microsoft.com/sharepoint/v3/contenttype/forms">
-  <Display>DocumentLibraryForm</Display>
-  <Edit>DocumentLibraryForm</Edit>
-  <New>DocumentLibraryForm</New>
-</FormTemplates>
+<file path=customXml/item2.xml><?xml version="1.0" encoding="utf-8"?>
+<p:properties xmlns:p="http://schemas.microsoft.com/office/2006/metadata/properties" xmlns:xsi="http://www.w3.org/2001/XMLSchema-instance" xmlns:pc="http://schemas.microsoft.com/office/infopath/2007/PartnerControls">
+  <documentManagement>
+    <_dlc_DocId xmlns="727178e8-9586-4f49-8e7b-77af9c2fb085">CVD5QAC74SYH-2-13943</_dlc_DocId>
+    <_dlc_DocIdUrl xmlns="727178e8-9586-4f49-8e7b-77af9c2fb085">
+      <Url>https://share.gft.com/sites/Corporate-Marketing/_layouts/DocIdRedir.aspx?ID=CVD5QAC74SYH-2-13943</Url>
+      <Description>CVD5QAC74SYH-2-13943</Description>
+    </_dlc_DocIdUrl>
+    <Functional_x0020_Area xmlns="e44e039f-c551-4112-981c-456f1b630ef1">Functional Area 1</Functional_x0020_Area>
+    <Reference_x0020_Title xmlns="e44e039f-c551-4112-981c-456f1b630ef1" xsi:nil="true"/>
+    <Area xmlns="e44e039f-c551-4112-981c-456f1b630ef1">Area 1</Area>
+    <Project_x0020_size_x0020__x0028_resources_x0029_ xmlns="e44e039f-c551-4112-981c-456f1b630ef1" xsi:nil="true"/>
+    <Comments xmlns="e44e039f-c551-4112-981c-456f1b630ef1" xsi:nil="true"/>
+    <Business_x0020_Sector xmlns="e44e039f-c551-4112-981c-456f1b630ef1">Banking</Business_x0020_Sector>
+    <Client_x0020_Category xmlns="e44e039f-c551-4112-981c-456f1b630ef1">Central</Client_x0020_Category>
+    <Methods_x0020_and_x0020_standards xmlns="e44e039f-c551-4112-981c-456f1b630ef1" xsi:nil="true"/>
+    <Responsible xmlns="e44e039f-c551-4112-981c-456f1b630ef1">Marek Strejczek</Responsible>
+    <Client_x0020_Name xmlns="e44e039f-c551-4112-981c-456f1b630ef1" xsi:nil="true"/>
+    <Client_x0020_approval xmlns="e44e039f-c551-4112-981c-456f1b630ef1">No</Client_x0020_approval>
+    <Plattform_x0020__x0026__x0020_tools xmlns="e44e039f-c551-4112-981c-456f1b630ef1" xsi:nil="true"/>
+    <Project_x0020_ID xmlns="e44e039f-c551-4112-981c-456f1b630ef1" xsi:nil="true"/>
+    <Description0 xmlns="e44e039f-c551-4112-981c-456f1b630ef1" xsi:nil="true"/>
+    <Author_x0020__x002f__x0020_Contact xmlns="e44e039f-c551-4112-981c-456f1b630ef1">
+      <UserInfo>
+        <DisplayName/>
+        <AccountId xsi:nil="true"/>
+        <AccountType/>
+      </UserInfo>
+    </Author_x0020__x002f__x0020_Contact>
+    <Client_x0020_Country xmlns="e44e039f-c551-4112-981c-456f1b630ef1">Germany</Client_x0020_Country>
+    <Year xmlns="e44e039f-c551-4112-981c-456f1b630ef1" xsi:nil="true"/>
+  </documentManagement>
+</p:properties>
 </file>
 
-<file path=customXml/item4.xml><?xml version="1.0" encoding="utf-8"?>
+<file path=customXml/item3.xml><?xml version="1.0" encoding="utf-8"?>
 <ct:contentTypeSchema xmlns:ct="http://schemas.microsoft.com/office/2006/metadata/contentType" xmlns:ma="http://schemas.microsoft.com/office/2006/metadata/properties/metaAttributes" ct:_="" ma:_="" ma:contentTypeName="Document" ma:contentTypeID="0x010100793B9935CA02AD4F90F0A0FD564FDD82" ma:contentTypeVersion="17" ma:contentTypeDescription="Create a new document." ma:contentTypeScope="" ma:versionID="6168266ad0b2c1ccdc9d2ae0268a5eb6">
   <xsd:schema xmlns:xsd="http://www.w3.org/2001/XMLSchema" xmlns:xs="http://www.w3.org/2001/XMLSchema" xmlns:p="http://schemas.microsoft.com/office/2006/metadata/properties" xmlns:ns2="e44e039f-c551-4112-981c-456f1b630ef1" xmlns:ns3="727178e8-9586-4f49-8e7b-77af9c2fb085" targetNamespace="http://schemas.microsoft.com/office/2006/metadata/properties" ma:root="true" ma:fieldsID="b9b29daf9bb73cd90369de1b0e977594" ns2:_="" ns3:_="">
     <xsd:import namespace="e44e039f-c551-4112-981c-456f1b630ef1"/>
@@ -19188,7 +19178,24 @@
 </ct:contentTypeSchema>
 </file>
 
+<file path=customXml/item4.xml><?xml version="1.0" encoding="utf-8"?>
+<?mso-contentType ?>
+<FormTemplates xmlns="http://schemas.microsoft.com/sharepoint/v3/contenttype/forms">
+  <Display>DocumentLibraryForm</Display>
+  <Edit>DocumentLibraryForm</Edit>
+  <New>DocumentLibraryForm</New>
+</FormTemplates>
+</file>
+
 <file path=customXml/itemProps1.xml><?xml version="1.0" encoding="utf-8"?>
+<ds:datastoreItem xmlns:ds="http://schemas.openxmlformats.org/officeDocument/2006/customXml" ds:itemID="{A6F3EA8F-EBA0-438A-80BD-6A96E2E10054}">
+  <ds:schemaRefs>
+    <ds:schemaRef ds:uri="http://schemas.microsoft.com/sharepoint/events"/>
+  </ds:schemaRefs>
+</ds:datastoreItem>
+</file>
+
+<file path=customXml/itemProps2.xml><?xml version="1.0" encoding="utf-8"?>
 <ds:datastoreItem xmlns:ds="http://schemas.openxmlformats.org/officeDocument/2006/customXml" ds:itemID="{7445AAF4-B73F-4E3A-B9D2-4DDAE0F1BE8A}">
   <ds:schemaRefs>
     <ds:schemaRef ds:uri="http://purl.org/dc/dcmitype/"/>
@@ -19205,23 +19212,7 @@
 </ds:datastoreItem>
 </file>
 
-<file path=customXml/itemProps2.xml><?xml version="1.0" encoding="utf-8"?>
-<ds:datastoreItem xmlns:ds="http://schemas.openxmlformats.org/officeDocument/2006/customXml" ds:itemID="{A6F3EA8F-EBA0-438A-80BD-6A96E2E10054}">
-  <ds:schemaRefs>
-    <ds:schemaRef ds:uri="http://schemas.microsoft.com/sharepoint/events"/>
-  </ds:schemaRefs>
-</ds:datastoreItem>
-</file>
-
 <file path=customXml/itemProps3.xml><?xml version="1.0" encoding="utf-8"?>
-<ds:datastoreItem xmlns:ds="http://schemas.openxmlformats.org/officeDocument/2006/customXml" ds:itemID="{9217953E-6BB7-40C6-9A84-608D0A8D65EC}">
-  <ds:schemaRefs>
-    <ds:schemaRef ds:uri="http://schemas.microsoft.com/sharepoint/v3/contenttype/forms"/>
-  </ds:schemaRefs>
-</ds:datastoreItem>
-</file>
-
-<file path=customXml/itemProps4.xml><?xml version="1.0" encoding="utf-8"?>
 <ds:datastoreItem xmlns:ds="http://schemas.openxmlformats.org/officeDocument/2006/customXml" ds:itemID="{54CA1130-EAC1-4116-82E4-DF5A51FE3AEA}">
   <ds:schemaRefs>
     <ds:schemaRef ds:uri="http://schemas.microsoft.com/office/2006/metadata/contentType"/>
@@ -19238,4 +19229,12 @@
     <ds:schemaRef ds:uri="http://schemas.microsoft.com/internal/obd"/>
   </ds:schemaRefs>
 </ds:datastoreItem>
+</file>
+
+<file path=customXml/itemProps4.xml><?xml version="1.0" encoding="utf-8"?>
+<ds:datastoreItem xmlns:ds="http://schemas.openxmlformats.org/officeDocument/2006/customXml" ds:itemID="{9217953E-6BB7-40C6-9A84-608D0A8D65EC}">
+  <ds:schemaRefs>
+    <ds:schemaRef ds:uri="http://schemas.microsoft.com/sharepoint/v3/contenttype/forms"/>
+  </ds:schemaRefs>
+</ds:datastoreItem>
 </file>
</xml_diff>